<commit_message>
Dernières modifications de la présentation
</commit_message>
<xml_diff>
--- a/dossiers/Final - Présentation Projet de recherche.pptx
+++ b/dossiers/Final - Présentation Projet de recherche.pptx
@@ -5,10 +5,10 @@
     <p:sldMasterId id="2147483672" r:id="rId1"/>
   </p:sldMasterIdLst>
   <p:notesMasterIdLst>
-    <p:notesMasterId r:id="rId50"/>
+    <p:notesMasterId r:id="rId53"/>
   </p:notesMasterIdLst>
   <p:handoutMasterIdLst>
-    <p:handoutMasterId r:id="rId51"/>
+    <p:handoutMasterId r:id="rId54"/>
   </p:handoutMasterIdLst>
   <p:sldIdLst>
     <p:sldId id="256" r:id="rId2"/>
@@ -49,16 +49,19 @@
     <p:sldId id="274" r:id="rId37"/>
     <p:sldId id="303" r:id="rId38"/>
     <p:sldId id="275" r:id="rId39"/>
-    <p:sldId id="295" r:id="rId40"/>
-    <p:sldId id="298" r:id="rId41"/>
-    <p:sldId id="271" r:id="rId42"/>
-    <p:sldId id="276" r:id="rId43"/>
-    <p:sldId id="294" r:id="rId44"/>
-    <p:sldId id="286" r:id="rId45"/>
-    <p:sldId id="283" r:id="rId46"/>
-    <p:sldId id="284" r:id="rId47"/>
-    <p:sldId id="272" r:id="rId48"/>
-    <p:sldId id="312" r:id="rId49"/>
+    <p:sldId id="315" r:id="rId40"/>
+    <p:sldId id="295" r:id="rId41"/>
+    <p:sldId id="298" r:id="rId42"/>
+    <p:sldId id="271" r:id="rId43"/>
+    <p:sldId id="276" r:id="rId44"/>
+    <p:sldId id="294" r:id="rId45"/>
+    <p:sldId id="286" r:id="rId46"/>
+    <p:sldId id="283" r:id="rId47"/>
+    <p:sldId id="284" r:id="rId48"/>
+    <p:sldId id="272" r:id="rId49"/>
+    <p:sldId id="312" r:id="rId50"/>
+    <p:sldId id="313" r:id="rId51"/>
+    <p:sldId id="314" r:id="rId52"/>
   </p:sldIdLst>
   <p:sldSz cx="9144000" cy="6858000" type="screen4x3"/>
   <p:notesSz cx="6740525" cy="9920288"/>
@@ -4233,7 +4236,7 @@
           <a:p>
             <a:fld id="{D96E78EE-E500-441D-8E30-6F9FE2B24F52}" type="slidenum">
               <a:rPr lang="fr-FR" smtClean="0"/>
-              <a:t>39</a:t>
+              <a:t>40</a:t>
             </a:fld>
             <a:endParaRPr lang="fr-FR"/>
           </a:p>
@@ -4541,7 +4544,7 @@
           <a:p>
             <a:fld id="{D96E78EE-E500-441D-8E30-6F9FE2B24F52}" type="slidenum">
               <a:rPr lang="fr-FR" smtClean="0"/>
-              <a:t>40</a:t>
+              <a:t>41</a:t>
             </a:fld>
             <a:endParaRPr lang="fr-FR"/>
           </a:p>
@@ -4659,7 +4662,7 @@
           <a:p>
             <a:fld id="{D96E78EE-E500-441D-8E30-6F9FE2B24F52}" type="slidenum">
               <a:rPr lang="fr-FR" smtClean="0"/>
-              <a:t>41</a:t>
+              <a:t>42</a:t>
             </a:fld>
             <a:endParaRPr lang="fr-FR"/>
           </a:p>
@@ -4871,7 +4874,7 @@
           <a:p>
             <a:fld id="{D96E78EE-E500-441D-8E30-6F9FE2B24F52}" type="slidenum">
               <a:rPr lang="fr-FR" smtClean="0"/>
-              <a:t>42</a:t>
+              <a:t>43</a:t>
             </a:fld>
             <a:endParaRPr lang="fr-FR"/>
           </a:p>
@@ -4955,7 +4958,7 @@
           <a:p>
             <a:fld id="{D96E78EE-E500-441D-8E30-6F9FE2B24F52}" type="slidenum">
               <a:rPr lang="fr-FR" smtClean="0"/>
-              <a:t>43</a:t>
+              <a:t>44</a:t>
             </a:fld>
             <a:endParaRPr lang="fr-FR"/>
           </a:p>
@@ -5049,7 +5052,7 @@
           <a:p>
             <a:fld id="{D96E78EE-E500-441D-8E30-6F9FE2B24F52}" type="slidenum">
               <a:rPr lang="fr-FR" smtClean="0"/>
-              <a:t>44</a:t>
+              <a:t>45</a:t>
             </a:fld>
             <a:endParaRPr lang="fr-FR"/>
           </a:p>
@@ -5139,7 +5142,7 @@
           <a:p>
             <a:fld id="{D96E78EE-E500-441D-8E30-6F9FE2B24F52}" type="slidenum">
               <a:rPr lang="fr-FR" smtClean="0"/>
-              <a:t>45</a:t>
+              <a:t>46</a:t>
             </a:fld>
             <a:endParaRPr lang="fr-FR"/>
           </a:p>
@@ -5229,7 +5232,7 @@
           <a:p>
             <a:fld id="{D96E78EE-E500-441D-8E30-6F9FE2B24F52}" type="slidenum">
               <a:rPr lang="fr-FR" smtClean="0"/>
-              <a:t>46</a:t>
+              <a:t>47</a:t>
             </a:fld>
             <a:endParaRPr lang="fr-FR"/>
           </a:p>
@@ -5313,7 +5316,7 @@
           <a:p>
             <a:fld id="{D96E78EE-E500-441D-8E30-6F9FE2B24F52}" type="slidenum">
               <a:rPr lang="fr-FR" smtClean="0"/>
-              <a:t>47</a:t>
+              <a:t>48</a:t>
             </a:fld>
             <a:endParaRPr lang="fr-FR"/>
           </a:p>
@@ -5403,7 +5406,7 @@
           <a:p>
             <a:fld id="{D96E78EE-E500-441D-8E30-6F9FE2B24F52}" type="slidenum">
               <a:rPr lang="fr-FR" smtClean="0"/>
-              <a:t>48</a:t>
+              <a:t>49</a:t>
             </a:fld>
             <a:endParaRPr lang="fr-FR"/>
           </a:p>
@@ -5413,6 +5416,90 @@
     <p:extLst>
       <p:ext uri="{BB962C8B-B14F-4D97-AF65-F5344CB8AC3E}">
         <p14:creationId xmlns:p14="http://schemas.microsoft.com/office/powerpoint/2010/main" val="1725953408"/>
+      </p:ext>
+    </p:extLst>
+  </p:cSld>
+  <p:clrMapOvr>
+    <a:masterClrMapping/>
+  </p:clrMapOvr>
+</p:notes>
+</file>
+
+<file path=ppt/notesSlides/notesSlide49.xml><?xml version="1.0" encoding="utf-8"?>
+<p:notes xmlns:a="http://schemas.openxmlformats.org/drawingml/2006/main" xmlns:r="http://schemas.openxmlformats.org/officeDocument/2006/relationships" xmlns:p="http://schemas.openxmlformats.org/presentationml/2006/main">
+  <p:cSld>
+    <p:spTree>
+      <p:nvGrpSpPr>
+        <p:cNvPr id="1" name=""/>
+        <p:cNvGrpSpPr/>
+        <p:nvPr/>
+      </p:nvGrpSpPr>
+      <p:grpSpPr>
+        <a:xfrm>
+          <a:off x="0" y="0"/>
+          <a:ext cx="0" cy="0"/>
+          <a:chOff x="0" y="0"/>
+          <a:chExt cx="0" cy="0"/>
+        </a:xfrm>
+      </p:grpSpPr>
+      <p:sp>
+        <p:nvSpPr>
+          <p:cNvPr id="2" name="Espace réservé de l'image des diapositives 1"/>
+          <p:cNvSpPr>
+            <a:spLocks noGrp="1" noRot="1" noChangeAspect="1"/>
+          </p:cNvSpPr>
+          <p:nvPr>
+            <p:ph type="sldImg"/>
+          </p:nvPr>
+        </p:nvSpPr>
+        <p:spPr/>
+      </p:sp>
+      <p:sp>
+        <p:nvSpPr>
+          <p:cNvPr id="3" name="Espace réservé des commentaires 2"/>
+          <p:cNvSpPr>
+            <a:spLocks noGrp="1"/>
+          </p:cNvSpPr>
+          <p:nvPr>
+            <p:ph type="body" idx="1"/>
+          </p:nvPr>
+        </p:nvSpPr>
+        <p:spPr/>
+        <p:txBody>
+          <a:bodyPr/>
+          <a:lstStyle/>
+          <a:p>
+            <a:endParaRPr lang="fr-FR" dirty="0"/>
+          </a:p>
+        </p:txBody>
+      </p:sp>
+      <p:sp>
+        <p:nvSpPr>
+          <p:cNvPr id="4" name="Espace réservé du numéro de diapositive 3"/>
+          <p:cNvSpPr>
+            <a:spLocks noGrp="1"/>
+          </p:cNvSpPr>
+          <p:nvPr>
+            <p:ph type="sldNum" sz="quarter" idx="10"/>
+          </p:nvPr>
+        </p:nvSpPr>
+        <p:spPr/>
+        <p:txBody>
+          <a:bodyPr/>
+          <a:lstStyle/>
+          <a:p>
+            <a:fld id="{D96E78EE-E500-441D-8E30-6F9FE2B24F52}" type="slidenum">
+              <a:rPr lang="fr-FR" smtClean="0"/>
+              <a:t>50</a:t>
+            </a:fld>
+            <a:endParaRPr lang="fr-FR"/>
+          </a:p>
+        </p:txBody>
+      </p:sp>
+    </p:spTree>
+    <p:extLst>
+      <p:ext uri="{BB962C8B-B14F-4D97-AF65-F5344CB8AC3E}">
+        <p14:creationId xmlns:p14="http://schemas.microsoft.com/office/powerpoint/2010/main" val="2977200725"/>
       </p:ext>
     </p:extLst>
   </p:cSld>
@@ -5497,6 +5584,90 @@
     <p:extLst>
       <p:ext uri="{BB962C8B-B14F-4D97-AF65-F5344CB8AC3E}">
         <p14:creationId xmlns:p14="http://schemas.microsoft.com/office/powerpoint/2010/main" val="2055716059"/>
+      </p:ext>
+    </p:extLst>
+  </p:cSld>
+  <p:clrMapOvr>
+    <a:masterClrMapping/>
+  </p:clrMapOvr>
+</p:notes>
+</file>
+
+<file path=ppt/notesSlides/notesSlide50.xml><?xml version="1.0" encoding="utf-8"?>
+<p:notes xmlns:a="http://schemas.openxmlformats.org/drawingml/2006/main" xmlns:r="http://schemas.openxmlformats.org/officeDocument/2006/relationships" xmlns:p="http://schemas.openxmlformats.org/presentationml/2006/main">
+  <p:cSld>
+    <p:spTree>
+      <p:nvGrpSpPr>
+        <p:cNvPr id="1" name=""/>
+        <p:cNvGrpSpPr/>
+        <p:nvPr/>
+      </p:nvGrpSpPr>
+      <p:grpSpPr>
+        <a:xfrm>
+          <a:off x="0" y="0"/>
+          <a:ext cx="0" cy="0"/>
+          <a:chOff x="0" y="0"/>
+          <a:chExt cx="0" cy="0"/>
+        </a:xfrm>
+      </p:grpSpPr>
+      <p:sp>
+        <p:nvSpPr>
+          <p:cNvPr id="2" name="Espace réservé de l'image des diapositives 1"/>
+          <p:cNvSpPr>
+            <a:spLocks noGrp="1" noRot="1" noChangeAspect="1"/>
+          </p:cNvSpPr>
+          <p:nvPr>
+            <p:ph type="sldImg"/>
+          </p:nvPr>
+        </p:nvSpPr>
+        <p:spPr/>
+      </p:sp>
+      <p:sp>
+        <p:nvSpPr>
+          <p:cNvPr id="3" name="Espace réservé des commentaires 2"/>
+          <p:cNvSpPr>
+            <a:spLocks noGrp="1"/>
+          </p:cNvSpPr>
+          <p:nvPr>
+            <p:ph type="body" idx="1"/>
+          </p:nvPr>
+        </p:nvSpPr>
+        <p:spPr/>
+        <p:txBody>
+          <a:bodyPr/>
+          <a:lstStyle/>
+          <a:p>
+            <a:endParaRPr lang="fr-FR"/>
+          </a:p>
+        </p:txBody>
+      </p:sp>
+      <p:sp>
+        <p:nvSpPr>
+          <p:cNvPr id="4" name="Espace réservé du numéro de diapositive 3"/>
+          <p:cNvSpPr>
+            <a:spLocks noGrp="1"/>
+          </p:cNvSpPr>
+          <p:nvPr>
+            <p:ph type="sldNum" sz="quarter" idx="10"/>
+          </p:nvPr>
+        </p:nvSpPr>
+        <p:spPr/>
+        <p:txBody>
+          <a:bodyPr/>
+          <a:lstStyle/>
+          <a:p>
+            <a:fld id="{D96E78EE-E500-441D-8E30-6F9FE2B24F52}" type="slidenum">
+              <a:rPr lang="fr-FR" smtClean="0"/>
+              <a:t>51</a:t>
+            </a:fld>
+            <a:endParaRPr lang="fr-FR"/>
+          </a:p>
+        </p:txBody>
+      </p:sp>
+    </p:spTree>
+    <p:extLst>
+      <p:ext uri="{BB962C8B-B14F-4D97-AF65-F5344CB8AC3E}">
+        <p14:creationId xmlns:p14="http://schemas.microsoft.com/office/powerpoint/2010/main" val="3598573028"/>
       </p:ext>
     </p:extLst>
   </p:cSld>
@@ -27013,13 +27184,13 @@
           <p:nvPr>
             <p:extLst>
               <p:ext uri="{D42A27DB-BD31-4B8C-83A1-F6EECF244321}">
-                <p14:modId xmlns:p14="http://schemas.microsoft.com/office/powerpoint/2010/main" val="2376465224"/>
+                <p14:modId xmlns:p14="http://schemas.microsoft.com/office/powerpoint/2010/main" val="3402722705"/>
               </p:ext>
             </p:extLst>
           </p:nvPr>
         </p:nvGraphicFramePr>
         <p:xfrm>
-          <a:off x="419744" y="2806365"/>
+          <a:off x="419744" y="2741049"/>
           <a:ext cx="8304512" cy="2123440"/>
         </p:xfrm>
         <a:graphic>
@@ -28207,13 +28378,13 @@
           <p:nvPr>
             <p:extLst>
               <p:ext uri="{D42A27DB-BD31-4B8C-83A1-F6EECF244321}">
-                <p14:modId xmlns:p14="http://schemas.microsoft.com/office/powerpoint/2010/main" val="1289018419"/>
+                <p14:modId xmlns:p14="http://schemas.microsoft.com/office/powerpoint/2010/main" val="1519369680"/>
               </p:ext>
             </p:extLst>
           </p:nvPr>
         </p:nvGraphicFramePr>
         <p:xfrm>
-          <a:off x="419744" y="2724720"/>
+          <a:off x="419744" y="2741049"/>
           <a:ext cx="8304512" cy="2123440"/>
         </p:xfrm>
         <a:graphic>
@@ -28998,13 +29169,13 @@
           <p:nvPr>
             <p:extLst>
               <p:ext uri="{D42A27DB-BD31-4B8C-83A1-F6EECF244321}">
-                <p14:modId xmlns:p14="http://schemas.microsoft.com/office/powerpoint/2010/main" val="888551298"/>
+                <p14:modId xmlns:p14="http://schemas.microsoft.com/office/powerpoint/2010/main" val="3743706647"/>
               </p:ext>
             </p:extLst>
           </p:nvPr>
         </p:nvGraphicFramePr>
         <p:xfrm>
-          <a:off x="419744" y="2806365"/>
+          <a:off x="419744" y="2741049"/>
           <a:ext cx="8304512" cy="2123440"/>
         </p:xfrm>
         <a:graphic>
@@ -30662,7 +30833,7 @@
             </a:br>
             <a:r>
               <a:rPr lang="fr-FR" dirty="0"/>
-              <a:t>constructions remarquables</a:t>
+              <a:t>interprétations sémantiques</a:t>
             </a:r>
           </a:p>
         </p:txBody>
@@ -30686,14 +30857,43 @@
         <p:spPr>
           <a:xfrm>
             <a:off x="533400" y="2336872"/>
-            <a:ext cx="8287072" cy="4152468"/>
+            <a:ext cx="8610600" cy="4152468"/>
           </a:xfrm>
         </p:spPr>
         <p:txBody>
           <a:bodyPr>
-            <a:normAutofit fontScale="92500"/>
+            <a:normAutofit/>
           </a:bodyPr>
           <a:lstStyle/>
+          <a:p>
+            <a:r>
+              <a:rPr lang="fr-FR" cap="small" dirty="0">
+                <a:latin typeface="Consolas" panose="020B0609020204030204" pitchFamily="49" charset="0"/>
+                <a:cs typeface="Consolas" panose="020B0609020204030204" pitchFamily="49" charset="0"/>
+              </a:rPr>
+              <a:t>objet + cadre</a:t>
+            </a:r>
+            <a:r>
+              <a:rPr lang="fr-FR" dirty="0">
+                <a:latin typeface="Consolas" panose="020B0609020204030204" pitchFamily="49" charset="0"/>
+                <a:cs typeface="Consolas" panose="020B0609020204030204" pitchFamily="49" charset="0"/>
+              </a:rPr>
+              <a:t> : un outil [ de pour ] </a:t>
+            </a:r>
+            <a:r>
+              <a:rPr lang="fr-FR" cap="small" dirty="0">
+                <a:latin typeface="Consolas" panose="020B0609020204030204" pitchFamily="49" charset="0"/>
+                <a:cs typeface="Consolas" panose="020B0609020204030204" pitchFamily="49" charset="0"/>
+              </a:rPr>
+              <a:t>but</a:t>
+            </a:r>
+          </a:p>
+          <a:p>
+            <a:endParaRPr lang="fr-FR" cap="small" dirty="0">
+              <a:latin typeface="Consolas" panose="020B0609020204030204" pitchFamily="49" charset="0"/>
+              <a:cs typeface="Consolas" panose="020B0609020204030204" pitchFamily="49" charset="0"/>
+            </a:endParaRPr>
+          </a:p>
           <a:p>
             <a:r>
               <a:rPr lang="fr-FR" cap="small" dirty="0">
@@ -30707,21 +30907,7 @@
                 <a:latin typeface="Consolas" panose="020B0609020204030204" pitchFamily="49" charset="0"/>
                 <a:cs typeface="Consolas" panose="020B0609020204030204" pitchFamily="49" charset="0"/>
               </a:rPr>
-              <a:t> : </a:t>
-            </a:r>
-            <a:r>
-              <a:rPr lang="fr-FR" b="1" dirty="0">
-                <a:latin typeface="Consolas" panose="020B0609020204030204" pitchFamily="49" charset="0"/>
-                <a:cs typeface="Consolas" panose="020B0609020204030204" pitchFamily="49" charset="0"/>
-              </a:rPr>
-              <a:t>application [ à dans en chez ]</a:t>
-            </a:r>
-            <a:r>
-              <a:rPr lang="fr-FR" dirty="0">
-                <a:latin typeface="Consolas" panose="020B0609020204030204" pitchFamily="49" charset="0"/>
-                <a:cs typeface="Consolas" panose="020B0609020204030204" pitchFamily="49" charset="0"/>
-              </a:rPr>
-              <a:t> </a:t>
+              <a:t> : application [à dans en chez] </a:t>
             </a:r>
             <a:r>
               <a:rPr lang="fr-FR" cap="small" dirty="0">
@@ -30730,60 +30916,13 @@
               </a:rPr>
               <a:t>cadre</a:t>
             </a:r>
+            <a:endParaRPr lang="fr-FR" dirty="0"/>
           </a:p>
           <a:p>
             <a:pPr marL="0" indent="0">
               <a:buNone/>
             </a:pPr>
-            <a:endParaRPr lang="fr-FR" sz="900" dirty="0"/>
-          </a:p>
-          <a:p>
-            <a:pPr marL="0" indent="0">
-              <a:buNone/>
-            </a:pPr>
-            <a:r>
-              <a:rPr lang="fr-FR" dirty="0"/>
-              <a:t>Comparaison de différentes méthodes d'interprétation de la prédiction de l'eau corporelle par la méthode de dilution de l'eau lourde : </a:t>
-            </a:r>
-            <a:r>
-              <a:rPr lang="fr-FR" b="1" dirty="0"/>
-              <a:t>application chez </a:t>
-            </a:r>
-            <a:r>
-              <a:rPr lang="fr-FR" dirty="0"/>
-              <a:t>le chevreau mâle</a:t>
-            </a:r>
-          </a:p>
-          <a:p>
-            <a:pPr marL="0" indent="0" algn="r">
-              <a:buNone/>
-            </a:pPr>
-            <a:r>
-              <a:rPr lang="fr-FR" dirty="0"/>
-              <a:t>(</a:t>
-            </a:r>
-            <a:r>
-              <a:rPr lang="fr-FR" dirty="0" err="1"/>
-              <a:t>Schmidely</a:t>
-            </a:r>
-            <a:r>
-              <a:rPr lang="fr-FR" dirty="0"/>
-              <a:t>, </a:t>
-            </a:r>
-            <a:r>
-              <a:rPr lang="fr-FR" dirty="0" err="1"/>
-              <a:t>Robelin</a:t>
-            </a:r>
-            <a:r>
-              <a:rPr lang="fr-FR" dirty="0"/>
-              <a:t> &amp; Bas, 1989, Article)</a:t>
-            </a:r>
-          </a:p>
-          <a:p>
-            <a:pPr marL="0" indent="0">
-              <a:buNone/>
-            </a:pPr>
-            <a:endParaRPr lang="fr-FR" sz="900" dirty="0">
+            <a:endParaRPr lang="fr-FR" dirty="0">
               <a:latin typeface="Consolas" panose="020B0609020204030204" pitchFamily="49" charset="0"/>
               <a:cs typeface="Consolas" panose="020B0609020204030204" pitchFamily="49" charset="0"/>
             </a:endParaRPr>
@@ -30801,14 +30940,14 @@
                 <a:latin typeface="Consolas" panose="020B0609020204030204" pitchFamily="49" charset="0"/>
                 <a:cs typeface="Consolas" panose="020B0609020204030204" pitchFamily="49" charset="0"/>
               </a:rPr>
-              <a:t> : </a:t>
+              <a:t> : application de</a:t>
             </a:r>
             <a:r>
               <a:rPr lang="fr-FR" b="1" dirty="0">
                 <a:latin typeface="Consolas" panose="020B0609020204030204" pitchFamily="49" charset="0"/>
                 <a:cs typeface="Consolas" panose="020B0609020204030204" pitchFamily="49" charset="0"/>
               </a:rPr>
-              <a:t>application de </a:t>
+              <a:t> </a:t>
             </a:r>
             <a:r>
               <a:rPr lang="fr-FR" cap="small" dirty="0">
@@ -31226,29 +31365,6 @@
             <a:normAutofit/>
           </a:bodyPr>
           <a:lstStyle/>
-          <a:p>
-            <a:r>
-              <a:rPr lang="fr-FR" cap="small" dirty="0">
-                <a:latin typeface="Consolas" panose="020B0609020204030204" pitchFamily="49" charset="0"/>
-                <a:cs typeface="Consolas" panose="020B0609020204030204" pitchFamily="49" charset="0"/>
-              </a:rPr>
-              <a:t>objet + cadre</a:t>
-            </a:r>
-            <a:r>
-              <a:rPr lang="fr-FR" dirty="0">
-                <a:latin typeface="Consolas" panose="020B0609020204030204" pitchFamily="49" charset="0"/>
-                <a:cs typeface="Consolas" panose="020B0609020204030204" pitchFamily="49" charset="0"/>
-              </a:rPr>
-              <a:t> : un outil [ de pour ] </a:t>
-            </a:r>
-            <a:r>
-              <a:rPr lang="fr-FR" cap="small" dirty="0">
-                <a:latin typeface="Consolas" panose="020B0609020204030204" pitchFamily="49" charset="0"/>
-                <a:cs typeface="Consolas" panose="020B0609020204030204" pitchFamily="49" charset="0"/>
-              </a:rPr>
-              <a:t>but</a:t>
-            </a:r>
-          </a:p>
           <a:p>
             <a:endParaRPr lang="fr-FR" dirty="0">
               <a:latin typeface="Consolas" panose="020B0609020204030204" pitchFamily="49" charset="0"/>
@@ -33361,234 +33477,153 @@
       </p:grpSpPr>
       <p:sp>
         <p:nvSpPr>
-          <p:cNvPr id="2" name="Titre 1"/>
+          <p:cNvPr id="2" name="Titre 1">
+            <a:extLst>
+              <a:ext uri="{FF2B5EF4-FFF2-40B4-BE49-F238E27FC236}">
+                <a16:creationId xmlns:a16="http://schemas.microsoft.com/office/drawing/2014/main" id="{A47A890B-9A7D-4019-BAAF-D57638C6E202}"/>
+              </a:ext>
+            </a:extLst>
+          </p:cNvPr>
           <p:cNvSpPr>
             <a:spLocks noGrp="1"/>
           </p:cNvSpPr>
           <p:nvPr>
-            <p:ph type="ctrTitle"/>
+            <p:ph type="title"/>
+          </p:nvPr>
+        </p:nvSpPr>
+        <p:spPr/>
+        <p:txBody>
+          <a:bodyPr/>
+          <a:lstStyle/>
+          <a:p>
+            <a:r>
+              <a:rPr lang="fr-FR" dirty="0"/>
+              <a:t>Explications des ordres</a:t>
+            </a:r>
+          </a:p>
+        </p:txBody>
+      </p:sp>
+      <p:sp>
+        <p:nvSpPr>
+          <p:cNvPr id="3" name="Espace réservé du contenu 2">
+            <a:extLst>
+              <a:ext uri="{FF2B5EF4-FFF2-40B4-BE49-F238E27FC236}">
+                <a16:creationId xmlns:a16="http://schemas.microsoft.com/office/drawing/2014/main" id="{476740B0-7496-4E88-9113-56812F4A0BDD}"/>
+              </a:ext>
+            </a:extLst>
+          </p:cNvPr>
+          <p:cNvSpPr>
+            <a:spLocks noGrp="1"/>
+          </p:cNvSpPr>
+          <p:nvPr>
+            <p:ph idx="1"/>
           </p:nvPr>
         </p:nvSpPr>
         <p:spPr>
           <a:xfrm>
-            <a:off x="936898" y="3079183"/>
-            <a:ext cx="5939358" cy="648073"/>
+            <a:off x="533400" y="2336873"/>
+            <a:ext cx="6887389" cy="3599316"/>
           </a:xfrm>
         </p:spPr>
         <p:txBody>
-          <a:bodyPr>
-            <a:normAutofit/>
-          </a:bodyPr>
+          <a:bodyPr/>
           <a:lstStyle/>
           <a:p>
-            <a:pPr algn="l"/>
-            <a:r>
-              <a:rPr lang="fr-FR" sz="3000" dirty="0"/>
-              <a:t>III. Bilan, limites et perspectives</a:t>
-            </a:r>
+            <a:pPr lvl="1">
+              <a:buFont typeface="Wingdings" panose="05000000000000000000" pitchFamily="2" charset="2"/>
+              <a:buChar char="§"/>
+            </a:pPr>
+            <a:r>
+              <a:rPr lang="fr-FR" sz="2600" dirty="0"/>
+              <a:t>Contraintes d’ordres des noms dans les syntagmes SP et SNC</a:t>
+            </a:r>
+          </a:p>
+          <a:p>
+            <a:pPr lvl="2"/>
+            <a:r>
+              <a:rPr lang="fr-FR" sz="2400" dirty="0"/>
+              <a:t>Sémantico-logique : 	</a:t>
+            </a:r>
+          </a:p>
+          <a:p>
+            <a:pPr marL="914400" lvl="2" indent="0">
+              <a:buNone/>
+            </a:pPr>
+            <a:r>
+              <a:rPr lang="fr-FR" sz="2400" dirty="0"/>
+              <a:t>	reprise de la logique temporelle</a:t>
+            </a:r>
+          </a:p>
+          <a:p>
+            <a:pPr lvl="2"/>
+            <a:r>
+              <a:rPr lang="fr-FR" sz="2400" dirty="0"/>
+              <a:t>Rhétorique : </a:t>
+            </a:r>
+          </a:p>
+          <a:p>
+            <a:pPr marL="914400" lvl="2" indent="0">
+              <a:buNone/>
+            </a:pPr>
+            <a:r>
+              <a:rPr lang="fr-FR" sz="2400" dirty="0"/>
+              <a:t>	d’abord le positif avant le négatif</a:t>
+            </a:r>
+          </a:p>
+          <a:p>
+            <a:pPr lvl="2"/>
+            <a:r>
+              <a:rPr lang="fr-FR" sz="2400" dirty="0"/>
+              <a:t>Didactique : </a:t>
+            </a:r>
+          </a:p>
+          <a:p>
+            <a:pPr marL="914400" lvl="2" indent="0">
+              <a:buNone/>
+            </a:pPr>
+            <a:r>
+              <a:rPr lang="fr-FR" sz="2400" dirty="0"/>
+              <a:t>	la théorie puis la pratique</a:t>
+            </a:r>
+          </a:p>
+          <a:p>
+            <a:endParaRPr lang="fr-FR" dirty="0"/>
           </a:p>
         </p:txBody>
       </p:sp>
-      <p:grpSp>
-        <p:nvGrpSpPr>
-          <p:cNvPr id="3" name="Groupe 2">
+      <p:sp>
+        <p:nvSpPr>
+          <p:cNvPr id="4" name="Espace réservé du numéro de diapositive 3">
             <a:extLst>
               <a:ext uri="{FF2B5EF4-FFF2-40B4-BE49-F238E27FC236}">
-                <a16:creationId xmlns:a16="http://schemas.microsoft.com/office/drawing/2014/main" id="{13B2BC6B-A064-4967-858C-608DE27A0D15}"/>
+                <a16:creationId xmlns:a16="http://schemas.microsoft.com/office/drawing/2014/main" id="{DB2C5413-2B63-4732-BB83-F93263BA1418}"/>
               </a:ext>
             </a:extLst>
           </p:cNvPr>
-          <p:cNvGrpSpPr/>
-          <p:nvPr/>
-        </p:nvGrpSpPr>
-        <p:grpSpPr>
-          <a:xfrm>
-            <a:off x="0" y="6273316"/>
-            <a:ext cx="9144000" cy="216024"/>
-            <a:chOff x="0" y="6273316"/>
-            <a:chExt cx="9144000" cy="216024"/>
-          </a:xfrm>
-        </p:grpSpPr>
-        <p:cxnSp>
-          <p:nvCxnSpPr>
-            <p:cNvPr id="8" name="Connecteur droit 7"/>
-            <p:cNvCxnSpPr/>
-            <p:nvPr/>
-          </p:nvCxnSpPr>
-          <p:spPr>
-            <a:xfrm>
-              <a:off x="0" y="6381328"/>
-              <a:ext cx="9144000" cy="0"/>
-            </a:xfrm>
-            <a:prstGeom prst="line">
-              <a:avLst/>
-            </a:prstGeom>
-            <a:ln w="19050" cmpd="sng"/>
-          </p:spPr>
-          <p:style>
-            <a:lnRef idx="1">
-              <a:schemeClr val="accent1"/>
-            </a:lnRef>
-            <a:fillRef idx="0">
-              <a:schemeClr val="accent1"/>
-            </a:fillRef>
-            <a:effectRef idx="0">
-              <a:schemeClr val="accent1"/>
-            </a:effectRef>
-            <a:fontRef idx="minor">
-              <a:schemeClr val="tx1"/>
-            </a:fontRef>
-          </p:style>
-        </p:cxnSp>
-        <p:sp>
-          <p:nvSpPr>
-            <p:cNvPr id="15" name="Losange 14"/>
-            <p:cNvSpPr/>
-            <p:nvPr/>
-          </p:nvSpPr>
-          <p:spPr>
-            <a:xfrm>
-              <a:off x="323528" y="6273316"/>
-              <a:ext cx="216024" cy="216024"/>
-            </a:xfrm>
-            <a:prstGeom prst="diamond">
-              <a:avLst/>
-            </a:prstGeom>
-            <a:solidFill>
-              <a:schemeClr val="bg1"/>
-            </a:solidFill>
-            <a:ln>
-              <a:solidFill>
-                <a:schemeClr val="accent1"/>
-              </a:solidFill>
-            </a:ln>
-          </p:spPr>
-          <p:style>
-            <a:lnRef idx="2">
-              <a:schemeClr val="accent1">
-                <a:shade val="50000"/>
-              </a:schemeClr>
-            </a:lnRef>
-            <a:fillRef idx="1">
-              <a:schemeClr val="accent1"/>
-            </a:fillRef>
-            <a:effectRef idx="0">
-              <a:schemeClr val="accent1"/>
-            </a:effectRef>
-            <a:fontRef idx="minor">
-              <a:schemeClr val="lt1"/>
-            </a:fontRef>
-          </p:style>
-          <p:txBody>
-            <a:bodyPr rtlCol="0" anchor="ctr"/>
-            <a:lstStyle/>
-            <a:p>
-              <a:pPr algn="ctr"/>
-              <a:endParaRPr lang="fr-FR"/>
-            </a:p>
-          </p:txBody>
-        </p:sp>
-        <p:sp>
-          <p:nvSpPr>
-            <p:cNvPr id="16" name="Losange 15"/>
-            <p:cNvSpPr/>
-            <p:nvPr/>
-          </p:nvSpPr>
-          <p:spPr>
-            <a:xfrm>
-              <a:off x="584474" y="6273316"/>
-              <a:ext cx="216024" cy="216024"/>
-            </a:xfrm>
-            <a:prstGeom prst="diamond">
-              <a:avLst/>
-            </a:prstGeom>
-            <a:solidFill>
-              <a:schemeClr val="bg1"/>
-            </a:solidFill>
-            <a:ln>
-              <a:solidFill>
-                <a:schemeClr val="accent1"/>
-              </a:solidFill>
-            </a:ln>
-          </p:spPr>
-          <p:style>
-            <a:lnRef idx="2">
-              <a:schemeClr val="accent1">
-                <a:shade val="50000"/>
-              </a:schemeClr>
-            </a:lnRef>
-            <a:fillRef idx="1">
-              <a:schemeClr val="accent1"/>
-            </a:fillRef>
-            <a:effectRef idx="0">
-              <a:schemeClr val="accent1"/>
-            </a:effectRef>
-            <a:fontRef idx="minor">
-              <a:schemeClr val="lt1"/>
-            </a:fontRef>
-          </p:style>
-          <p:txBody>
-            <a:bodyPr rtlCol="0" anchor="ctr"/>
-            <a:lstStyle/>
-            <a:p>
-              <a:pPr algn="ctr"/>
-              <a:endParaRPr lang="fr-FR"/>
-            </a:p>
-          </p:txBody>
-        </p:sp>
-        <p:sp>
-          <p:nvSpPr>
-            <p:cNvPr id="17" name="Losange 16"/>
-            <p:cNvSpPr/>
-            <p:nvPr/>
-          </p:nvSpPr>
-          <p:spPr>
-            <a:xfrm>
-              <a:off x="839489" y="6273316"/>
-              <a:ext cx="216024" cy="216024"/>
-            </a:xfrm>
-            <a:prstGeom prst="diamond">
-              <a:avLst/>
-            </a:prstGeom>
-            <a:solidFill>
-              <a:schemeClr val="bg1"/>
-            </a:solidFill>
-            <a:ln>
-              <a:solidFill>
-                <a:schemeClr val="accent1"/>
-              </a:solidFill>
-            </a:ln>
-          </p:spPr>
-          <p:style>
-            <a:lnRef idx="2">
-              <a:schemeClr val="accent1">
-                <a:shade val="50000"/>
-              </a:schemeClr>
-            </a:lnRef>
-            <a:fillRef idx="1">
-              <a:schemeClr val="accent1"/>
-            </a:fillRef>
-            <a:effectRef idx="0">
-              <a:schemeClr val="accent1"/>
-            </a:effectRef>
-            <a:fontRef idx="minor">
-              <a:schemeClr val="lt1"/>
-            </a:fontRef>
-          </p:style>
-          <p:txBody>
-            <a:bodyPr rtlCol="0" anchor="ctr"/>
-            <a:lstStyle/>
-            <a:p>
-              <a:pPr algn="ctr"/>
-              <a:endParaRPr lang="fr-FR"/>
-            </a:p>
-          </p:txBody>
-        </p:sp>
-      </p:grpSp>
+          <p:cNvSpPr>
+            <a:spLocks noGrp="1"/>
+          </p:cNvSpPr>
+          <p:nvPr>
+            <p:ph type="sldNum" sz="quarter" idx="12"/>
+          </p:nvPr>
+        </p:nvSpPr>
+        <p:spPr/>
+        <p:txBody>
+          <a:bodyPr/>
+          <a:lstStyle/>
+          <a:p>
+            <a:fld id="{C0F704EE-905A-40C8-920A-A399B5829FA9}" type="slidenum">
+              <a:rPr lang="fr-FR" smtClean="0"/>
+              <a:t>39</a:t>
+            </a:fld>
+            <a:endParaRPr lang="fr-FR"/>
+          </a:p>
+        </p:txBody>
+      </p:sp>
     </p:spTree>
     <p:extLst>
       <p:ext uri="{BB962C8B-B14F-4D97-AF65-F5344CB8AC3E}">
-        <p14:creationId xmlns:p14="http://schemas.microsoft.com/office/powerpoint/2010/main" val="2876423294"/>
+        <p14:creationId xmlns:p14="http://schemas.microsoft.com/office/powerpoint/2010/main" val="2302133202"/>
       </p:ext>
     </p:extLst>
   </p:cSld>
@@ -34044,6 +34079,262 @@
       </p:grpSpPr>
       <p:sp>
         <p:nvSpPr>
+          <p:cNvPr id="2" name="Titre 1"/>
+          <p:cNvSpPr>
+            <a:spLocks noGrp="1"/>
+          </p:cNvSpPr>
+          <p:nvPr>
+            <p:ph type="ctrTitle"/>
+          </p:nvPr>
+        </p:nvSpPr>
+        <p:spPr>
+          <a:xfrm>
+            <a:off x="936898" y="3079183"/>
+            <a:ext cx="5939358" cy="648073"/>
+          </a:xfrm>
+        </p:spPr>
+        <p:txBody>
+          <a:bodyPr>
+            <a:normAutofit/>
+          </a:bodyPr>
+          <a:lstStyle/>
+          <a:p>
+            <a:pPr algn="l"/>
+            <a:r>
+              <a:rPr lang="fr-FR" sz="3000" dirty="0"/>
+              <a:t>III. Bilan, limites et perspectives</a:t>
+            </a:r>
+          </a:p>
+        </p:txBody>
+      </p:sp>
+      <p:grpSp>
+        <p:nvGrpSpPr>
+          <p:cNvPr id="3" name="Groupe 2">
+            <a:extLst>
+              <a:ext uri="{FF2B5EF4-FFF2-40B4-BE49-F238E27FC236}">
+                <a16:creationId xmlns:a16="http://schemas.microsoft.com/office/drawing/2014/main" id="{13B2BC6B-A064-4967-858C-608DE27A0D15}"/>
+              </a:ext>
+            </a:extLst>
+          </p:cNvPr>
+          <p:cNvGrpSpPr/>
+          <p:nvPr/>
+        </p:nvGrpSpPr>
+        <p:grpSpPr>
+          <a:xfrm>
+            <a:off x="0" y="6273316"/>
+            <a:ext cx="9144000" cy="216024"/>
+            <a:chOff x="0" y="6273316"/>
+            <a:chExt cx="9144000" cy="216024"/>
+          </a:xfrm>
+        </p:grpSpPr>
+        <p:cxnSp>
+          <p:nvCxnSpPr>
+            <p:cNvPr id="8" name="Connecteur droit 7"/>
+            <p:cNvCxnSpPr/>
+            <p:nvPr/>
+          </p:nvCxnSpPr>
+          <p:spPr>
+            <a:xfrm>
+              <a:off x="0" y="6381328"/>
+              <a:ext cx="9144000" cy="0"/>
+            </a:xfrm>
+            <a:prstGeom prst="line">
+              <a:avLst/>
+            </a:prstGeom>
+            <a:ln w="19050" cmpd="sng"/>
+          </p:spPr>
+          <p:style>
+            <a:lnRef idx="1">
+              <a:schemeClr val="accent1"/>
+            </a:lnRef>
+            <a:fillRef idx="0">
+              <a:schemeClr val="accent1"/>
+            </a:fillRef>
+            <a:effectRef idx="0">
+              <a:schemeClr val="accent1"/>
+            </a:effectRef>
+            <a:fontRef idx="minor">
+              <a:schemeClr val="tx1"/>
+            </a:fontRef>
+          </p:style>
+        </p:cxnSp>
+        <p:sp>
+          <p:nvSpPr>
+            <p:cNvPr id="15" name="Losange 14"/>
+            <p:cNvSpPr/>
+            <p:nvPr/>
+          </p:nvSpPr>
+          <p:spPr>
+            <a:xfrm>
+              <a:off x="323528" y="6273316"/>
+              <a:ext cx="216024" cy="216024"/>
+            </a:xfrm>
+            <a:prstGeom prst="diamond">
+              <a:avLst/>
+            </a:prstGeom>
+            <a:solidFill>
+              <a:schemeClr val="bg1"/>
+            </a:solidFill>
+            <a:ln>
+              <a:solidFill>
+                <a:schemeClr val="accent1"/>
+              </a:solidFill>
+            </a:ln>
+          </p:spPr>
+          <p:style>
+            <a:lnRef idx="2">
+              <a:schemeClr val="accent1">
+                <a:shade val="50000"/>
+              </a:schemeClr>
+            </a:lnRef>
+            <a:fillRef idx="1">
+              <a:schemeClr val="accent1"/>
+            </a:fillRef>
+            <a:effectRef idx="0">
+              <a:schemeClr val="accent1"/>
+            </a:effectRef>
+            <a:fontRef idx="minor">
+              <a:schemeClr val="lt1"/>
+            </a:fontRef>
+          </p:style>
+          <p:txBody>
+            <a:bodyPr rtlCol="0" anchor="ctr"/>
+            <a:lstStyle/>
+            <a:p>
+              <a:pPr algn="ctr"/>
+              <a:endParaRPr lang="fr-FR"/>
+            </a:p>
+          </p:txBody>
+        </p:sp>
+        <p:sp>
+          <p:nvSpPr>
+            <p:cNvPr id="16" name="Losange 15"/>
+            <p:cNvSpPr/>
+            <p:nvPr/>
+          </p:nvSpPr>
+          <p:spPr>
+            <a:xfrm>
+              <a:off x="584474" y="6273316"/>
+              <a:ext cx="216024" cy="216024"/>
+            </a:xfrm>
+            <a:prstGeom prst="diamond">
+              <a:avLst/>
+            </a:prstGeom>
+            <a:solidFill>
+              <a:schemeClr val="bg1"/>
+            </a:solidFill>
+            <a:ln>
+              <a:solidFill>
+                <a:schemeClr val="accent1"/>
+              </a:solidFill>
+            </a:ln>
+          </p:spPr>
+          <p:style>
+            <a:lnRef idx="2">
+              <a:schemeClr val="accent1">
+                <a:shade val="50000"/>
+              </a:schemeClr>
+            </a:lnRef>
+            <a:fillRef idx="1">
+              <a:schemeClr val="accent1"/>
+            </a:fillRef>
+            <a:effectRef idx="0">
+              <a:schemeClr val="accent1"/>
+            </a:effectRef>
+            <a:fontRef idx="minor">
+              <a:schemeClr val="lt1"/>
+            </a:fontRef>
+          </p:style>
+          <p:txBody>
+            <a:bodyPr rtlCol="0" anchor="ctr"/>
+            <a:lstStyle/>
+            <a:p>
+              <a:pPr algn="ctr"/>
+              <a:endParaRPr lang="fr-FR"/>
+            </a:p>
+          </p:txBody>
+        </p:sp>
+        <p:sp>
+          <p:nvSpPr>
+            <p:cNvPr id="17" name="Losange 16"/>
+            <p:cNvSpPr/>
+            <p:nvPr/>
+          </p:nvSpPr>
+          <p:spPr>
+            <a:xfrm>
+              <a:off x="839489" y="6273316"/>
+              <a:ext cx="216024" cy="216024"/>
+            </a:xfrm>
+            <a:prstGeom prst="diamond">
+              <a:avLst/>
+            </a:prstGeom>
+            <a:solidFill>
+              <a:schemeClr val="bg1"/>
+            </a:solidFill>
+            <a:ln>
+              <a:solidFill>
+                <a:schemeClr val="accent1"/>
+              </a:solidFill>
+            </a:ln>
+          </p:spPr>
+          <p:style>
+            <a:lnRef idx="2">
+              <a:schemeClr val="accent1">
+                <a:shade val="50000"/>
+              </a:schemeClr>
+            </a:lnRef>
+            <a:fillRef idx="1">
+              <a:schemeClr val="accent1"/>
+            </a:fillRef>
+            <a:effectRef idx="0">
+              <a:schemeClr val="accent1"/>
+            </a:effectRef>
+            <a:fontRef idx="minor">
+              <a:schemeClr val="lt1"/>
+            </a:fontRef>
+          </p:style>
+          <p:txBody>
+            <a:bodyPr rtlCol="0" anchor="ctr"/>
+            <a:lstStyle/>
+            <a:p>
+              <a:pPr algn="ctr"/>
+              <a:endParaRPr lang="fr-FR"/>
+            </a:p>
+          </p:txBody>
+        </p:sp>
+      </p:grpSp>
+    </p:spTree>
+    <p:extLst>
+      <p:ext uri="{BB962C8B-B14F-4D97-AF65-F5344CB8AC3E}">
+        <p14:creationId xmlns:p14="http://schemas.microsoft.com/office/powerpoint/2010/main" val="2876423294"/>
+      </p:ext>
+    </p:extLst>
+  </p:cSld>
+  <p:clrMapOvr>
+    <a:masterClrMapping/>
+  </p:clrMapOvr>
+</p:sld>
+</file>
+
+<file path=ppt/slides/slide41.xml><?xml version="1.0" encoding="utf-8"?>
+<p:sld xmlns:a="http://schemas.openxmlformats.org/drawingml/2006/main" xmlns:r="http://schemas.openxmlformats.org/officeDocument/2006/relationships" xmlns:p="http://schemas.openxmlformats.org/presentationml/2006/main">
+  <p:cSld>
+    <p:spTree>
+      <p:nvGrpSpPr>
+        <p:cNvPr id="1" name=""/>
+        <p:cNvGrpSpPr/>
+        <p:nvPr/>
+      </p:nvGrpSpPr>
+      <p:grpSpPr>
+        <a:xfrm>
+          <a:off x="0" y="0"/>
+          <a:ext cx="0" cy="0"/>
+          <a:chOff x="0" y="0"/>
+          <a:chExt cx="0" cy="0"/>
+        </a:xfrm>
+      </p:grpSpPr>
+      <p:sp>
+        <p:nvSpPr>
           <p:cNvPr id="2" name="Titre 1">
             <a:extLst>
               <a:ext uri="{FF2B5EF4-FFF2-40B4-BE49-F238E27FC236}">
@@ -34089,12 +34380,12 @@
         <p:spPr>
           <a:xfrm>
             <a:off x="533400" y="2336872"/>
-            <a:ext cx="8610600" cy="4152468"/>
+            <a:ext cx="8287072" cy="4152468"/>
           </a:xfrm>
         </p:spPr>
         <p:txBody>
           <a:bodyPr>
-            <a:normAutofit fontScale="85000" lnSpcReduction="10000"/>
+            <a:normAutofit lnSpcReduction="10000"/>
           </a:bodyPr>
           <a:lstStyle/>
           <a:p>
@@ -34152,7 +34443,7 @@
             </a:pPr>
             <a:r>
               <a:rPr lang="fr-FR" sz="2600" dirty="0"/>
-              <a:t>Choix de certains syntagmes en fonction de la discipline</a:t>
+              <a:t>Choix de certains syntagmes lié à la discipline</a:t>
             </a:r>
           </a:p>
           <a:p>
@@ -34162,28 +34453,7 @@
             </a:pPr>
             <a:r>
               <a:rPr lang="fr-FR" sz="2600" dirty="0"/>
-              <a:t>Contraintes d’ordres des noms dans les syntagmes SP et SNC</a:t>
-            </a:r>
-          </a:p>
-          <a:p>
-            <a:pPr lvl="2"/>
-            <a:r>
-              <a:rPr lang="fr-FR" sz="2400" dirty="0"/>
-              <a:t>Sémantico-logique : 	reprise de la logique temporelle</a:t>
-            </a:r>
-          </a:p>
-          <a:p>
-            <a:pPr lvl="2"/>
-            <a:r>
-              <a:rPr lang="fr-FR" sz="2400" dirty="0"/>
-              <a:t>Rhétorique : 		d’abord le positif avant le négatif</a:t>
-            </a:r>
-          </a:p>
-          <a:p>
-            <a:pPr lvl="2"/>
-            <a:r>
-              <a:rPr lang="fr-FR" sz="2400" dirty="0"/>
-              <a:t>Didactique : 		la théorie puis la pratique</a:t>
+              <a:t>Contraintes d’ordres des noms dans syntagmes</a:t>
             </a:r>
           </a:p>
           <a:p>
@@ -34221,7 +34491,7 @@
           <a:p>
             <a:fld id="{C0F704EE-905A-40C8-920A-A399B5829FA9}" type="slidenum">
               <a:rPr lang="fr-FR" smtClean="0"/>
-              <a:t>40</a:t>
+              <a:t>41</a:t>
             </a:fld>
             <a:endParaRPr lang="fr-FR"/>
           </a:p>
@@ -34460,7 +34730,7 @@
 </p:sld>
 </file>
 
-<file path=ppt/slides/slide41.xml><?xml version="1.0" encoding="utf-8"?>
+<file path=ppt/slides/slide42.xml><?xml version="1.0" encoding="utf-8"?>
 <p:sld xmlns:a="http://schemas.openxmlformats.org/drawingml/2006/main" xmlns:r="http://schemas.openxmlformats.org/officeDocument/2006/relationships" xmlns:p="http://schemas.openxmlformats.org/presentationml/2006/main">
   <p:cSld>
     <p:spTree>
@@ -34623,7 +34893,7 @@
           <a:p>
             <a:fld id="{C0F704EE-905A-40C8-920A-A399B5829FA9}" type="slidenum">
               <a:rPr lang="fr-FR" smtClean="0"/>
-              <a:t>41</a:t>
+              <a:t>42</a:t>
             </a:fld>
             <a:endParaRPr lang="fr-FR"/>
           </a:p>
@@ -34862,7 +35132,7 @@
 </p:sld>
 </file>
 
-<file path=ppt/slides/slide42.xml><?xml version="1.0" encoding="utf-8"?>
+<file path=ppt/slides/slide43.xml><?xml version="1.0" encoding="utf-8"?>
 <p:sld xmlns:a="http://schemas.openxmlformats.org/drawingml/2006/main" xmlns:r="http://schemas.openxmlformats.org/officeDocument/2006/relationships" xmlns:p="http://schemas.openxmlformats.org/presentationml/2006/main">
   <p:cSld>
     <p:spTree>
@@ -35037,7 +35307,7 @@
           <a:p>
             <a:fld id="{C0F704EE-905A-40C8-920A-A399B5829FA9}" type="slidenum">
               <a:rPr lang="fr-FR" smtClean="0"/>
-              <a:t>42</a:t>
+              <a:t>43</a:t>
             </a:fld>
             <a:endParaRPr lang="fr-FR"/>
           </a:p>
@@ -35276,7 +35546,7 @@
 </p:sld>
 </file>
 
-<file path=ppt/slides/slide43.xml><?xml version="1.0" encoding="utf-8"?>
+<file path=ppt/slides/slide44.xml><?xml version="1.0" encoding="utf-8"?>
 <p:sld xmlns:a="http://schemas.openxmlformats.org/drawingml/2006/main" xmlns:r="http://schemas.openxmlformats.org/officeDocument/2006/relationships" xmlns:p="http://schemas.openxmlformats.org/presentationml/2006/main">
   <p:cSld>
     <p:spTree>
@@ -35532,7 +35802,7 @@
 </p:sld>
 </file>
 
-<file path=ppt/slides/slide44.xml><?xml version="1.0" encoding="utf-8"?>
+<file path=ppt/slides/slide45.xml><?xml version="1.0" encoding="utf-8"?>
 <p:sld xmlns:a="http://schemas.openxmlformats.org/drawingml/2006/main" xmlns:r="http://schemas.openxmlformats.org/officeDocument/2006/relationships" xmlns:p="http://schemas.openxmlformats.org/presentationml/2006/main">
   <p:cSld>
     <p:spTree>
@@ -35757,7 +36027,7 @@
           <a:p>
             <a:fld id="{C0F704EE-905A-40C8-920A-A399B5829FA9}" type="slidenum">
               <a:rPr lang="fr-FR" smtClean="0"/>
-              <a:t>44</a:t>
+              <a:t>45</a:t>
             </a:fld>
             <a:endParaRPr lang="fr-FR"/>
           </a:p>
@@ -35996,7 +36266,7 @@
 </p:sld>
 </file>
 
-<file path=ppt/slides/slide45.xml><?xml version="1.0" encoding="utf-8"?>
+<file path=ppt/slides/slide46.xml><?xml version="1.0" encoding="utf-8"?>
 <p:sld xmlns:a="http://schemas.openxmlformats.org/drawingml/2006/main" xmlns:r="http://schemas.openxmlformats.org/officeDocument/2006/relationships" xmlns:p="http://schemas.openxmlformats.org/presentationml/2006/main">
   <p:cSld>
     <p:spTree>
@@ -36127,7 +36397,7 @@
           <a:p>
             <a:fld id="{C0F704EE-905A-40C8-920A-A399B5829FA9}" type="slidenum">
               <a:rPr lang="fr-FR" smtClean="0"/>
-              <a:t>45</a:t>
+              <a:t>46</a:t>
             </a:fld>
             <a:endParaRPr lang="fr-FR"/>
           </a:p>
@@ -36718,7 +36988,7 @@
 </p:sld>
 </file>
 
-<file path=ppt/slides/slide46.xml><?xml version="1.0" encoding="utf-8"?>
+<file path=ppt/slides/slide47.xml><?xml version="1.0" encoding="utf-8"?>
 <p:sld xmlns:a="http://schemas.openxmlformats.org/drawingml/2006/main" xmlns:r="http://schemas.openxmlformats.org/officeDocument/2006/relationships" xmlns:p="http://schemas.openxmlformats.org/presentationml/2006/main">
   <p:cSld>
     <p:spTree>
@@ -36823,7 +37093,7 @@
           <a:p>
             <a:fld id="{C0F704EE-905A-40C8-920A-A399B5829FA9}" type="slidenum">
               <a:rPr lang="fr-FR" smtClean="0"/>
-              <a:t>46</a:t>
+              <a:t>47</a:t>
             </a:fld>
             <a:endParaRPr lang="fr-FR"/>
           </a:p>
@@ -37579,7 +37849,7 @@
 </p:sld>
 </file>
 
-<file path=ppt/slides/slide47.xml><?xml version="1.0" encoding="utf-8"?>
+<file path=ppt/slides/slide48.xml><?xml version="1.0" encoding="utf-8"?>
 <p:sld xmlns:a="http://schemas.openxmlformats.org/drawingml/2006/main" xmlns:r="http://schemas.openxmlformats.org/officeDocument/2006/relationships" xmlns:p="http://schemas.openxmlformats.org/presentationml/2006/main">
   <p:cSld>
     <p:spTree>
@@ -38109,7 +38379,7 @@
           <a:p>
             <a:fld id="{C0F704EE-905A-40C8-920A-A399B5829FA9}" type="slidenum">
               <a:rPr lang="fr-FR" smtClean="0"/>
-              <a:t>47</a:t>
+              <a:t>48</a:t>
             </a:fld>
             <a:endParaRPr lang="fr-FR"/>
           </a:p>
@@ -38348,7 +38618,7 @@
 </p:sld>
 </file>
 
-<file path=ppt/slides/slide48.xml><?xml version="1.0" encoding="utf-8"?>
+<file path=ppt/slides/slide49.xml><?xml version="1.0" encoding="utf-8"?>
 <p:sld xmlns:a="http://schemas.openxmlformats.org/drawingml/2006/main" xmlns:r="http://schemas.openxmlformats.org/officeDocument/2006/relationships" xmlns:p="http://schemas.openxmlformats.org/presentationml/2006/main">
   <p:cSld>
     <p:spTree>
@@ -38455,7 +38725,7 @@
           <a:p>
             <a:fld id="{C0F704EE-905A-40C8-920A-A399B5829FA9}" type="slidenum">
               <a:rPr lang="fr-FR" smtClean="0"/>
-              <a:t>48</a:t>
+              <a:t>49</a:t>
             </a:fld>
             <a:endParaRPr lang="fr-FR"/>
           </a:p>
@@ -39020,6 +39290,959 @@
     <p:extLst>
       <p:ext uri="{BB962C8B-B14F-4D97-AF65-F5344CB8AC3E}">
         <p14:creationId xmlns:p14="http://schemas.microsoft.com/office/powerpoint/2010/main" val="64545206"/>
+      </p:ext>
+    </p:extLst>
+  </p:cSld>
+  <p:clrMapOvr>
+    <a:masterClrMapping/>
+  </p:clrMapOvr>
+</p:sld>
+</file>
+
+<file path=ppt/slides/slide50.xml><?xml version="1.0" encoding="utf-8"?>
+<p:sld xmlns:a="http://schemas.openxmlformats.org/drawingml/2006/main" xmlns:r="http://schemas.openxmlformats.org/officeDocument/2006/relationships" xmlns:p="http://schemas.openxmlformats.org/presentationml/2006/main">
+  <p:cSld>
+    <p:spTree>
+      <p:nvGrpSpPr>
+        <p:cNvPr id="1" name=""/>
+        <p:cNvGrpSpPr/>
+        <p:nvPr/>
+      </p:nvGrpSpPr>
+      <p:grpSpPr>
+        <a:xfrm>
+          <a:off x="0" y="0"/>
+          <a:ext cx="0" cy="0"/>
+          <a:chOff x="0" y="0"/>
+          <a:chExt cx="0" cy="0"/>
+        </a:xfrm>
+      </p:grpSpPr>
+      <p:sp>
+        <p:nvSpPr>
+          <p:cNvPr id="2" name="Titre 1">
+            <a:extLst>
+              <a:ext uri="{FF2B5EF4-FFF2-40B4-BE49-F238E27FC236}">
+                <a16:creationId xmlns:a16="http://schemas.microsoft.com/office/drawing/2014/main" id="{FA764E25-6361-455D-AACB-9E8A6C15D64C}"/>
+              </a:ext>
+            </a:extLst>
+          </p:cNvPr>
+          <p:cNvSpPr>
+            <a:spLocks noGrp="1"/>
+          </p:cNvSpPr>
+          <p:nvPr>
+            <p:ph type="title"/>
+          </p:nvPr>
+        </p:nvSpPr>
+        <p:spPr/>
+        <p:txBody>
+          <a:bodyPr>
+            <a:normAutofit/>
+          </a:bodyPr>
+          <a:lstStyle/>
+          <a:p>
+            <a:r>
+              <a:rPr lang="fr-FR" dirty="0"/>
+              <a:t>Résultats du patron SN :</a:t>
+            </a:r>
+            <a:br>
+              <a:rPr lang="fr-FR" dirty="0"/>
+            </a:br>
+            <a:r>
+              <a:rPr lang="fr-FR" dirty="0"/>
+              <a:t>constructions remarquables</a:t>
+            </a:r>
+          </a:p>
+        </p:txBody>
+      </p:sp>
+      <p:sp>
+        <p:nvSpPr>
+          <p:cNvPr id="3" name="Espace réservé du contenu 2">
+            <a:extLst>
+              <a:ext uri="{FF2B5EF4-FFF2-40B4-BE49-F238E27FC236}">
+                <a16:creationId xmlns:a16="http://schemas.microsoft.com/office/drawing/2014/main" id="{47026679-D815-4F8E-9E0E-2E7EB1D87AC2}"/>
+              </a:ext>
+            </a:extLst>
+          </p:cNvPr>
+          <p:cNvSpPr>
+            <a:spLocks noGrp="1"/>
+          </p:cNvSpPr>
+          <p:nvPr>
+            <p:ph idx="1"/>
+          </p:nvPr>
+        </p:nvSpPr>
+        <p:spPr>
+          <a:xfrm>
+            <a:off x="533400" y="2336872"/>
+            <a:ext cx="8287072" cy="4152468"/>
+          </a:xfrm>
+        </p:spPr>
+        <p:txBody>
+          <a:bodyPr>
+            <a:normAutofit fontScale="92500"/>
+          </a:bodyPr>
+          <a:lstStyle/>
+          <a:p>
+            <a:r>
+              <a:rPr lang="fr-FR" cap="small" dirty="0">
+                <a:latin typeface="Consolas" panose="020B0609020204030204" pitchFamily="49" charset="0"/>
+                <a:cs typeface="Consolas" panose="020B0609020204030204" pitchFamily="49" charset="0"/>
+              </a:rPr>
+              <a:t>objet + méthode</a:t>
+            </a:r>
+            <a:r>
+              <a:rPr lang="fr-FR" dirty="0">
+                <a:latin typeface="Consolas" panose="020B0609020204030204" pitchFamily="49" charset="0"/>
+                <a:cs typeface="Consolas" panose="020B0609020204030204" pitchFamily="49" charset="0"/>
+              </a:rPr>
+              <a:t> : </a:t>
+            </a:r>
+            <a:r>
+              <a:rPr lang="fr-FR" b="1" dirty="0">
+                <a:latin typeface="Consolas" panose="020B0609020204030204" pitchFamily="49" charset="0"/>
+                <a:cs typeface="Consolas" panose="020B0609020204030204" pitchFamily="49" charset="0"/>
+              </a:rPr>
+              <a:t>application [ à dans en chez ]</a:t>
+            </a:r>
+            <a:r>
+              <a:rPr lang="fr-FR" dirty="0">
+                <a:latin typeface="Consolas" panose="020B0609020204030204" pitchFamily="49" charset="0"/>
+                <a:cs typeface="Consolas" panose="020B0609020204030204" pitchFamily="49" charset="0"/>
+              </a:rPr>
+              <a:t> </a:t>
+            </a:r>
+            <a:r>
+              <a:rPr lang="fr-FR" cap="small" dirty="0">
+                <a:latin typeface="Consolas" panose="020B0609020204030204" pitchFamily="49" charset="0"/>
+                <a:cs typeface="Consolas" panose="020B0609020204030204" pitchFamily="49" charset="0"/>
+              </a:rPr>
+              <a:t>cadre</a:t>
+            </a:r>
+          </a:p>
+          <a:p>
+            <a:pPr marL="0" indent="0">
+              <a:buNone/>
+            </a:pPr>
+            <a:endParaRPr lang="fr-FR" sz="900" dirty="0"/>
+          </a:p>
+          <a:p>
+            <a:pPr marL="0" indent="0">
+              <a:buNone/>
+            </a:pPr>
+            <a:r>
+              <a:rPr lang="fr-FR" dirty="0"/>
+              <a:t>Comparaison de différentes méthodes d'interprétation de la prédiction de l'eau corporelle par la méthode de dilution de l'eau lourde : </a:t>
+            </a:r>
+            <a:r>
+              <a:rPr lang="fr-FR" b="1" dirty="0"/>
+              <a:t>application chez </a:t>
+            </a:r>
+            <a:r>
+              <a:rPr lang="fr-FR" dirty="0"/>
+              <a:t>le chevreau mâle</a:t>
+            </a:r>
+          </a:p>
+          <a:p>
+            <a:pPr marL="0" indent="0" algn="r">
+              <a:buNone/>
+            </a:pPr>
+            <a:r>
+              <a:rPr lang="fr-FR" dirty="0"/>
+              <a:t>(</a:t>
+            </a:r>
+            <a:r>
+              <a:rPr lang="fr-FR" dirty="0" err="1"/>
+              <a:t>Schmidely</a:t>
+            </a:r>
+            <a:r>
+              <a:rPr lang="fr-FR" dirty="0"/>
+              <a:t>, </a:t>
+            </a:r>
+            <a:r>
+              <a:rPr lang="fr-FR" dirty="0" err="1"/>
+              <a:t>Robelin</a:t>
+            </a:r>
+            <a:r>
+              <a:rPr lang="fr-FR" dirty="0"/>
+              <a:t> &amp; Bas, 1989, Article)</a:t>
+            </a:r>
+          </a:p>
+          <a:p>
+            <a:pPr marL="0" indent="0">
+              <a:buNone/>
+            </a:pPr>
+            <a:endParaRPr lang="fr-FR" sz="900" dirty="0">
+              <a:latin typeface="Consolas" panose="020B0609020204030204" pitchFamily="49" charset="0"/>
+              <a:cs typeface="Consolas" panose="020B0609020204030204" pitchFamily="49" charset="0"/>
+            </a:endParaRPr>
+          </a:p>
+          <a:p>
+            <a:r>
+              <a:rPr lang="fr-FR" cap="small" dirty="0">
+                <a:latin typeface="Consolas" panose="020B0609020204030204" pitchFamily="49" charset="0"/>
+                <a:cs typeface="Consolas" panose="020B0609020204030204" pitchFamily="49" charset="0"/>
+              </a:rPr>
+              <a:t>objet + cadre</a:t>
+            </a:r>
+            <a:r>
+              <a:rPr lang="fr-FR" dirty="0">
+                <a:latin typeface="Consolas" panose="020B0609020204030204" pitchFamily="49" charset="0"/>
+                <a:cs typeface="Consolas" panose="020B0609020204030204" pitchFamily="49" charset="0"/>
+              </a:rPr>
+              <a:t> : </a:t>
+            </a:r>
+            <a:r>
+              <a:rPr lang="fr-FR" b="1" dirty="0">
+                <a:latin typeface="Consolas" panose="020B0609020204030204" pitchFamily="49" charset="0"/>
+                <a:cs typeface="Consolas" panose="020B0609020204030204" pitchFamily="49" charset="0"/>
+              </a:rPr>
+              <a:t>application de </a:t>
+            </a:r>
+            <a:r>
+              <a:rPr lang="fr-FR" cap="small" dirty="0">
+                <a:latin typeface="Consolas" panose="020B0609020204030204" pitchFamily="49" charset="0"/>
+                <a:cs typeface="Consolas" panose="020B0609020204030204" pitchFamily="49" charset="0"/>
+              </a:rPr>
+              <a:t>méthode</a:t>
+            </a:r>
+          </a:p>
+          <a:p>
+            <a:endParaRPr lang="fr-FR" sz="900" dirty="0"/>
+          </a:p>
+          <a:p>
+            <a:pPr marL="0" indent="0">
+              <a:buNone/>
+            </a:pPr>
+            <a:r>
+              <a:rPr lang="fr-FR" dirty="0"/>
+              <a:t>Échanges thermiques chez le porcelet nouveau-né : </a:t>
+            </a:r>
+            <a:r>
+              <a:rPr lang="fr-FR" b="1" dirty="0"/>
+              <a:t>application de </a:t>
+            </a:r>
+            <a:r>
+              <a:rPr lang="fr-FR" dirty="0"/>
+              <a:t>la méthode du bilan d'énergie </a:t>
+            </a:r>
+          </a:p>
+          <a:p>
+            <a:pPr marL="0" indent="0" algn="r">
+              <a:buNone/>
+            </a:pPr>
+            <a:r>
+              <a:rPr lang="fr-FR" dirty="0"/>
+              <a:t>(</a:t>
+            </a:r>
+            <a:r>
+              <a:rPr lang="fr-FR" dirty="0" err="1"/>
+              <a:t>Berbigier</a:t>
+            </a:r>
+            <a:r>
+              <a:rPr lang="fr-FR" dirty="0"/>
+              <a:t>, Le </a:t>
+            </a:r>
+            <a:r>
+              <a:rPr lang="fr-FR" dirty="0" err="1"/>
+              <a:t>Dividich</a:t>
+            </a:r>
+            <a:r>
+              <a:rPr lang="fr-FR" dirty="0"/>
+              <a:t> &amp; </a:t>
+            </a:r>
+            <a:r>
+              <a:rPr lang="fr-FR" dirty="0" err="1"/>
+              <a:t>Kobilinsky</a:t>
+            </a:r>
+            <a:r>
+              <a:rPr lang="fr-FR" dirty="0"/>
+              <a:t>, 1978, Article) </a:t>
+            </a:r>
+            <a:endParaRPr lang="fr-FR" dirty="0">
+              <a:latin typeface="Consolas" panose="020B0609020204030204" pitchFamily="49" charset="0"/>
+              <a:cs typeface="Consolas" panose="020B0609020204030204" pitchFamily="49" charset="0"/>
+            </a:endParaRPr>
+          </a:p>
+          <a:p>
+            <a:pPr marL="0" indent="0">
+              <a:buNone/>
+            </a:pPr>
+            <a:endParaRPr lang="fr-FR" dirty="0"/>
+          </a:p>
+        </p:txBody>
+      </p:sp>
+      <p:sp>
+        <p:nvSpPr>
+          <p:cNvPr id="4" name="Espace réservé du numéro de diapositive 3">
+            <a:extLst>
+              <a:ext uri="{FF2B5EF4-FFF2-40B4-BE49-F238E27FC236}">
+                <a16:creationId xmlns:a16="http://schemas.microsoft.com/office/drawing/2014/main" id="{A10B70E8-C8C7-4DC5-9766-AA9210F0D0ED}"/>
+              </a:ext>
+            </a:extLst>
+          </p:cNvPr>
+          <p:cNvSpPr>
+            <a:spLocks noGrp="1"/>
+          </p:cNvSpPr>
+          <p:nvPr>
+            <p:ph type="sldNum" sz="quarter" idx="12"/>
+          </p:nvPr>
+        </p:nvSpPr>
+        <p:spPr/>
+        <p:txBody>
+          <a:bodyPr/>
+          <a:lstStyle/>
+          <a:p>
+            <a:fld id="{C0F704EE-905A-40C8-920A-A399B5829FA9}" type="slidenum">
+              <a:rPr lang="fr-FR" smtClean="0"/>
+              <a:t>50</a:t>
+            </a:fld>
+            <a:endParaRPr lang="fr-FR"/>
+          </a:p>
+        </p:txBody>
+      </p:sp>
+      <p:grpSp>
+        <p:nvGrpSpPr>
+          <p:cNvPr id="5" name="Groupe 4">
+            <a:extLst>
+              <a:ext uri="{FF2B5EF4-FFF2-40B4-BE49-F238E27FC236}">
+                <a16:creationId xmlns:a16="http://schemas.microsoft.com/office/drawing/2014/main" id="{2651F6D9-43BE-4744-94AB-7B1842EBE426}"/>
+              </a:ext>
+            </a:extLst>
+          </p:cNvPr>
+          <p:cNvGrpSpPr/>
+          <p:nvPr/>
+        </p:nvGrpSpPr>
+        <p:grpSpPr>
+          <a:xfrm>
+            <a:off x="0" y="6273316"/>
+            <a:ext cx="9144000" cy="216024"/>
+            <a:chOff x="0" y="6273316"/>
+            <a:chExt cx="9144000" cy="216024"/>
+          </a:xfrm>
+        </p:grpSpPr>
+        <p:cxnSp>
+          <p:nvCxnSpPr>
+            <p:cNvPr id="6" name="Connecteur droit 5">
+              <a:extLst>
+                <a:ext uri="{FF2B5EF4-FFF2-40B4-BE49-F238E27FC236}">
+                  <a16:creationId xmlns:a16="http://schemas.microsoft.com/office/drawing/2014/main" id="{0CF5BD1D-D4DA-4620-9C2B-A53CFC18A1F2}"/>
+                </a:ext>
+              </a:extLst>
+            </p:cNvPr>
+            <p:cNvCxnSpPr/>
+            <p:nvPr/>
+          </p:nvCxnSpPr>
+          <p:spPr>
+            <a:xfrm>
+              <a:off x="0" y="6381328"/>
+              <a:ext cx="9144000" cy="0"/>
+            </a:xfrm>
+            <a:prstGeom prst="line">
+              <a:avLst/>
+            </a:prstGeom>
+            <a:ln w="19050" cmpd="sng"/>
+          </p:spPr>
+          <p:style>
+            <a:lnRef idx="1">
+              <a:schemeClr val="accent1"/>
+            </a:lnRef>
+            <a:fillRef idx="0">
+              <a:schemeClr val="accent1"/>
+            </a:fillRef>
+            <a:effectRef idx="0">
+              <a:schemeClr val="accent1"/>
+            </a:effectRef>
+            <a:fontRef idx="minor">
+              <a:schemeClr val="tx1"/>
+            </a:fontRef>
+          </p:style>
+        </p:cxnSp>
+        <p:sp>
+          <p:nvSpPr>
+            <p:cNvPr id="7" name="Losange 6">
+              <a:extLst>
+                <a:ext uri="{FF2B5EF4-FFF2-40B4-BE49-F238E27FC236}">
+                  <a16:creationId xmlns:a16="http://schemas.microsoft.com/office/drawing/2014/main" id="{EE47FBC6-6604-4639-9AF6-986B2E62DCD7}"/>
+                </a:ext>
+              </a:extLst>
+            </p:cNvPr>
+            <p:cNvSpPr/>
+            <p:nvPr/>
+          </p:nvSpPr>
+          <p:spPr>
+            <a:xfrm>
+              <a:off x="323528" y="6273316"/>
+              <a:ext cx="216024" cy="216024"/>
+            </a:xfrm>
+            <a:prstGeom prst="diamond">
+              <a:avLst/>
+            </a:prstGeom>
+            <a:solidFill>
+              <a:schemeClr val="bg1"/>
+            </a:solidFill>
+            <a:ln>
+              <a:solidFill>
+                <a:schemeClr val="accent1"/>
+              </a:solidFill>
+            </a:ln>
+          </p:spPr>
+          <p:style>
+            <a:lnRef idx="2">
+              <a:schemeClr val="accent1">
+                <a:shade val="50000"/>
+              </a:schemeClr>
+            </a:lnRef>
+            <a:fillRef idx="1">
+              <a:schemeClr val="accent1"/>
+            </a:fillRef>
+            <a:effectRef idx="0">
+              <a:schemeClr val="accent1"/>
+            </a:effectRef>
+            <a:fontRef idx="minor">
+              <a:schemeClr val="lt1"/>
+            </a:fontRef>
+          </p:style>
+          <p:txBody>
+            <a:bodyPr rtlCol="0" anchor="ctr"/>
+            <a:lstStyle/>
+            <a:p>
+              <a:pPr algn="ctr"/>
+              <a:endParaRPr lang="fr-FR"/>
+            </a:p>
+          </p:txBody>
+        </p:sp>
+        <p:sp>
+          <p:nvSpPr>
+            <p:cNvPr id="8" name="Losange 7">
+              <a:extLst>
+                <a:ext uri="{FF2B5EF4-FFF2-40B4-BE49-F238E27FC236}">
+                  <a16:creationId xmlns:a16="http://schemas.microsoft.com/office/drawing/2014/main" id="{7E5E2B90-469E-4ACF-8A26-A2BC7FB133EB}"/>
+                </a:ext>
+              </a:extLst>
+            </p:cNvPr>
+            <p:cNvSpPr/>
+            <p:nvPr/>
+          </p:nvSpPr>
+          <p:spPr>
+            <a:xfrm>
+              <a:off x="584474" y="6273316"/>
+              <a:ext cx="216024" cy="216024"/>
+            </a:xfrm>
+            <a:prstGeom prst="diamond">
+              <a:avLst/>
+            </a:prstGeom>
+            <a:solidFill>
+              <a:schemeClr val="bg1"/>
+            </a:solidFill>
+            <a:ln>
+              <a:solidFill>
+                <a:schemeClr val="accent1"/>
+              </a:solidFill>
+            </a:ln>
+          </p:spPr>
+          <p:style>
+            <a:lnRef idx="2">
+              <a:schemeClr val="accent1">
+                <a:shade val="50000"/>
+              </a:schemeClr>
+            </a:lnRef>
+            <a:fillRef idx="1">
+              <a:schemeClr val="accent1"/>
+            </a:fillRef>
+            <a:effectRef idx="0">
+              <a:schemeClr val="accent1"/>
+            </a:effectRef>
+            <a:fontRef idx="minor">
+              <a:schemeClr val="lt1"/>
+            </a:fontRef>
+          </p:style>
+          <p:txBody>
+            <a:bodyPr rtlCol="0" anchor="ctr"/>
+            <a:lstStyle/>
+            <a:p>
+              <a:pPr algn="ctr"/>
+              <a:endParaRPr lang="fr-FR"/>
+            </a:p>
+          </p:txBody>
+        </p:sp>
+        <p:sp>
+          <p:nvSpPr>
+            <p:cNvPr id="9" name="Losange 8">
+              <a:extLst>
+                <a:ext uri="{FF2B5EF4-FFF2-40B4-BE49-F238E27FC236}">
+                  <a16:creationId xmlns:a16="http://schemas.microsoft.com/office/drawing/2014/main" id="{D35975F0-F165-4A2A-8B05-7D65164E28EE}"/>
+                </a:ext>
+              </a:extLst>
+            </p:cNvPr>
+            <p:cNvSpPr/>
+            <p:nvPr/>
+          </p:nvSpPr>
+          <p:spPr>
+            <a:xfrm>
+              <a:off x="839489" y="6273316"/>
+              <a:ext cx="216024" cy="216024"/>
+            </a:xfrm>
+            <a:prstGeom prst="diamond">
+              <a:avLst/>
+            </a:prstGeom>
+            <a:solidFill>
+              <a:schemeClr val="bg1"/>
+            </a:solidFill>
+            <a:ln>
+              <a:solidFill>
+                <a:schemeClr val="accent1"/>
+              </a:solidFill>
+            </a:ln>
+          </p:spPr>
+          <p:style>
+            <a:lnRef idx="2">
+              <a:schemeClr val="accent1">
+                <a:shade val="50000"/>
+              </a:schemeClr>
+            </a:lnRef>
+            <a:fillRef idx="1">
+              <a:schemeClr val="accent1"/>
+            </a:fillRef>
+            <a:effectRef idx="0">
+              <a:schemeClr val="accent1"/>
+            </a:effectRef>
+            <a:fontRef idx="minor">
+              <a:schemeClr val="lt1"/>
+            </a:fontRef>
+          </p:style>
+          <p:txBody>
+            <a:bodyPr rtlCol="0" anchor="ctr"/>
+            <a:lstStyle/>
+            <a:p>
+              <a:pPr algn="ctr"/>
+              <a:endParaRPr lang="fr-FR"/>
+            </a:p>
+          </p:txBody>
+        </p:sp>
+      </p:grpSp>
+    </p:spTree>
+    <p:extLst>
+      <p:ext uri="{BB962C8B-B14F-4D97-AF65-F5344CB8AC3E}">
+        <p14:creationId xmlns:p14="http://schemas.microsoft.com/office/powerpoint/2010/main" val="2009336424"/>
+      </p:ext>
+    </p:extLst>
+  </p:cSld>
+  <p:clrMapOvr>
+    <a:masterClrMapping/>
+  </p:clrMapOvr>
+</p:sld>
+</file>
+
+<file path=ppt/slides/slide51.xml><?xml version="1.0" encoding="utf-8"?>
+<p:sld xmlns:a="http://schemas.openxmlformats.org/drawingml/2006/main" xmlns:r="http://schemas.openxmlformats.org/officeDocument/2006/relationships" xmlns:p="http://schemas.openxmlformats.org/presentationml/2006/main">
+  <p:cSld>
+    <p:spTree>
+      <p:nvGrpSpPr>
+        <p:cNvPr id="1" name=""/>
+        <p:cNvGrpSpPr/>
+        <p:nvPr/>
+      </p:nvGrpSpPr>
+      <p:grpSpPr>
+        <a:xfrm>
+          <a:off x="0" y="0"/>
+          <a:ext cx="0" cy="0"/>
+          <a:chOff x="0" y="0"/>
+          <a:chExt cx="0" cy="0"/>
+        </a:xfrm>
+      </p:grpSpPr>
+      <p:sp>
+        <p:nvSpPr>
+          <p:cNvPr id="2" name="Titre 1">
+            <a:extLst>
+              <a:ext uri="{FF2B5EF4-FFF2-40B4-BE49-F238E27FC236}">
+                <a16:creationId xmlns:a16="http://schemas.microsoft.com/office/drawing/2014/main" id="{FA764E25-6361-455D-AACB-9E8A6C15D64C}"/>
+              </a:ext>
+            </a:extLst>
+          </p:cNvPr>
+          <p:cNvSpPr>
+            <a:spLocks noGrp="1"/>
+          </p:cNvSpPr>
+          <p:nvPr>
+            <p:ph type="title"/>
+          </p:nvPr>
+        </p:nvSpPr>
+        <p:spPr/>
+        <p:txBody>
+          <a:bodyPr>
+            <a:normAutofit/>
+          </a:bodyPr>
+          <a:lstStyle/>
+          <a:p>
+            <a:r>
+              <a:rPr lang="fr-FR" dirty="0"/>
+              <a:t>Résultats du patron SN :</a:t>
+            </a:r>
+            <a:br>
+              <a:rPr lang="fr-FR" dirty="0"/>
+            </a:br>
+            <a:r>
+              <a:rPr lang="fr-FR" dirty="0"/>
+              <a:t>constructions remarquables</a:t>
+            </a:r>
+          </a:p>
+        </p:txBody>
+      </p:sp>
+      <p:sp>
+        <p:nvSpPr>
+          <p:cNvPr id="3" name="Espace réservé du contenu 2">
+            <a:extLst>
+              <a:ext uri="{FF2B5EF4-FFF2-40B4-BE49-F238E27FC236}">
+                <a16:creationId xmlns:a16="http://schemas.microsoft.com/office/drawing/2014/main" id="{47026679-D815-4F8E-9E0E-2E7EB1D87AC2}"/>
+              </a:ext>
+            </a:extLst>
+          </p:cNvPr>
+          <p:cNvSpPr>
+            <a:spLocks noGrp="1"/>
+          </p:cNvSpPr>
+          <p:nvPr>
+            <p:ph idx="1"/>
+          </p:nvPr>
+        </p:nvSpPr>
+        <p:spPr>
+          <a:xfrm>
+            <a:off x="533400" y="2336872"/>
+            <a:ext cx="7278960" cy="3936443"/>
+          </a:xfrm>
+        </p:spPr>
+        <p:txBody>
+          <a:bodyPr>
+            <a:normAutofit/>
+          </a:bodyPr>
+          <a:lstStyle/>
+          <a:p>
+            <a:r>
+              <a:rPr lang="fr-FR" cap="small" dirty="0">
+                <a:latin typeface="Consolas" panose="020B0609020204030204" pitchFamily="49" charset="0"/>
+                <a:cs typeface="Consolas" panose="020B0609020204030204" pitchFamily="49" charset="0"/>
+              </a:rPr>
+              <a:t>objet + cadre</a:t>
+            </a:r>
+            <a:r>
+              <a:rPr lang="fr-FR" dirty="0">
+                <a:latin typeface="Consolas" panose="020B0609020204030204" pitchFamily="49" charset="0"/>
+                <a:cs typeface="Consolas" panose="020B0609020204030204" pitchFamily="49" charset="0"/>
+              </a:rPr>
+              <a:t> : un outil [ de pour ] </a:t>
+            </a:r>
+            <a:r>
+              <a:rPr lang="fr-FR" cap="small" dirty="0">
+                <a:latin typeface="Consolas" panose="020B0609020204030204" pitchFamily="49" charset="0"/>
+                <a:cs typeface="Consolas" panose="020B0609020204030204" pitchFamily="49" charset="0"/>
+              </a:rPr>
+              <a:t>but</a:t>
+            </a:r>
+          </a:p>
+          <a:p>
+            <a:endParaRPr lang="fr-FR" dirty="0">
+              <a:latin typeface="Consolas" panose="020B0609020204030204" pitchFamily="49" charset="0"/>
+              <a:cs typeface="Consolas" panose="020B0609020204030204" pitchFamily="49" charset="0"/>
+            </a:endParaRPr>
+          </a:p>
+          <a:p>
+            <a:pPr marL="0" indent="0">
+              <a:buNone/>
+            </a:pPr>
+            <a:r>
+              <a:rPr lang="fr-FR" dirty="0"/>
+              <a:t>Micro-impression de BMP-2 et fibronectine sur des matériaux mous : </a:t>
+            </a:r>
+            <a:r>
+              <a:rPr lang="fr-FR" b="1" dirty="0"/>
+              <a:t>un outil pour </a:t>
+            </a:r>
+            <a:r>
+              <a:rPr lang="fr-FR" dirty="0"/>
+              <a:t>recréer la niche de cellules souches </a:t>
+            </a:r>
+            <a:r>
+              <a:rPr lang="fr-FR" i="1" dirty="0"/>
+              <a:t>in vitro </a:t>
+            </a:r>
+          </a:p>
+          <a:p>
+            <a:pPr marL="0" indent="0" algn="r">
+              <a:buNone/>
+            </a:pPr>
+            <a:r>
+              <a:rPr lang="fr-FR" dirty="0"/>
+              <a:t>(</a:t>
+            </a:r>
+            <a:r>
+              <a:rPr lang="fr-FR" dirty="0" err="1"/>
+              <a:t>Fitzpatrick</a:t>
+            </a:r>
+            <a:r>
+              <a:rPr lang="fr-FR" dirty="0"/>
+              <a:t>, 2018, Thèse) </a:t>
+            </a:r>
+          </a:p>
+          <a:p>
+            <a:pPr marL="0" indent="0">
+              <a:buNone/>
+            </a:pPr>
+            <a:endParaRPr lang="fr-FR" dirty="0">
+              <a:latin typeface="Consolas" panose="020B0609020204030204" pitchFamily="49" charset="0"/>
+              <a:cs typeface="Consolas" panose="020B0609020204030204" pitchFamily="49" charset="0"/>
+            </a:endParaRPr>
+          </a:p>
+        </p:txBody>
+      </p:sp>
+      <p:sp>
+        <p:nvSpPr>
+          <p:cNvPr id="4" name="Espace réservé du numéro de diapositive 3">
+            <a:extLst>
+              <a:ext uri="{FF2B5EF4-FFF2-40B4-BE49-F238E27FC236}">
+                <a16:creationId xmlns:a16="http://schemas.microsoft.com/office/drawing/2014/main" id="{A10B70E8-C8C7-4DC5-9766-AA9210F0D0ED}"/>
+              </a:ext>
+            </a:extLst>
+          </p:cNvPr>
+          <p:cNvSpPr>
+            <a:spLocks noGrp="1"/>
+          </p:cNvSpPr>
+          <p:nvPr>
+            <p:ph type="sldNum" sz="quarter" idx="12"/>
+          </p:nvPr>
+        </p:nvSpPr>
+        <p:spPr/>
+        <p:txBody>
+          <a:bodyPr/>
+          <a:lstStyle/>
+          <a:p>
+            <a:fld id="{C0F704EE-905A-40C8-920A-A399B5829FA9}" type="slidenum">
+              <a:rPr lang="fr-FR" smtClean="0"/>
+              <a:t>51</a:t>
+            </a:fld>
+            <a:endParaRPr lang="fr-FR"/>
+          </a:p>
+        </p:txBody>
+      </p:sp>
+      <p:grpSp>
+        <p:nvGrpSpPr>
+          <p:cNvPr id="5" name="Groupe 4">
+            <a:extLst>
+              <a:ext uri="{FF2B5EF4-FFF2-40B4-BE49-F238E27FC236}">
+                <a16:creationId xmlns:a16="http://schemas.microsoft.com/office/drawing/2014/main" id="{2651F6D9-43BE-4744-94AB-7B1842EBE426}"/>
+              </a:ext>
+            </a:extLst>
+          </p:cNvPr>
+          <p:cNvGrpSpPr/>
+          <p:nvPr/>
+        </p:nvGrpSpPr>
+        <p:grpSpPr>
+          <a:xfrm>
+            <a:off x="0" y="6273316"/>
+            <a:ext cx="9144000" cy="216024"/>
+            <a:chOff x="0" y="6273316"/>
+            <a:chExt cx="9144000" cy="216024"/>
+          </a:xfrm>
+        </p:grpSpPr>
+        <p:cxnSp>
+          <p:nvCxnSpPr>
+            <p:cNvPr id="6" name="Connecteur droit 5">
+              <a:extLst>
+                <a:ext uri="{FF2B5EF4-FFF2-40B4-BE49-F238E27FC236}">
+                  <a16:creationId xmlns:a16="http://schemas.microsoft.com/office/drawing/2014/main" id="{0CF5BD1D-D4DA-4620-9C2B-A53CFC18A1F2}"/>
+                </a:ext>
+              </a:extLst>
+            </p:cNvPr>
+            <p:cNvCxnSpPr/>
+            <p:nvPr/>
+          </p:nvCxnSpPr>
+          <p:spPr>
+            <a:xfrm>
+              <a:off x="0" y="6381328"/>
+              <a:ext cx="9144000" cy="0"/>
+            </a:xfrm>
+            <a:prstGeom prst="line">
+              <a:avLst/>
+            </a:prstGeom>
+            <a:ln w="19050" cmpd="sng"/>
+          </p:spPr>
+          <p:style>
+            <a:lnRef idx="1">
+              <a:schemeClr val="accent1"/>
+            </a:lnRef>
+            <a:fillRef idx="0">
+              <a:schemeClr val="accent1"/>
+            </a:fillRef>
+            <a:effectRef idx="0">
+              <a:schemeClr val="accent1"/>
+            </a:effectRef>
+            <a:fontRef idx="minor">
+              <a:schemeClr val="tx1"/>
+            </a:fontRef>
+          </p:style>
+        </p:cxnSp>
+        <p:sp>
+          <p:nvSpPr>
+            <p:cNvPr id="7" name="Losange 6">
+              <a:extLst>
+                <a:ext uri="{FF2B5EF4-FFF2-40B4-BE49-F238E27FC236}">
+                  <a16:creationId xmlns:a16="http://schemas.microsoft.com/office/drawing/2014/main" id="{EE47FBC6-6604-4639-9AF6-986B2E62DCD7}"/>
+                </a:ext>
+              </a:extLst>
+            </p:cNvPr>
+            <p:cNvSpPr/>
+            <p:nvPr/>
+          </p:nvSpPr>
+          <p:spPr>
+            <a:xfrm>
+              <a:off x="323528" y="6273316"/>
+              <a:ext cx="216024" cy="216024"/>
+            </a:xfrm>
+            <a:prstGeom prst="diamond">
+              <a:avLst/>
+            </a:prstGeom>
+            <a:solidFill>
+              <a:schemeClr val="bg1"/>
+            </a:solidFill>
+            <a:ln>
+              <a:solidFill>
+                <a:schemeClr val="accent1"/>
+              </a:solidFill>
+            </a:ln>
+          </p:spPr>
+          <p:style>
+            <a:lnRef idx="2">
+              <a:schemeClr val="accent1">
+                <a:shade val="50000"/>
+              </a:schemeClr>
+            </a:lnRef>
+            <a:fillRef idx="1">
+              <a:schemeClr val="accent1"/>
+            </a:fillRef>
+            <a:effectRef idx="0">
+              <a:schemeClr val="accent1"/>
+            </a:effectRef>
+            <a:fontRef idx="minor">
+              <a:schemeClr val="lt1"/>
+            </a:fontRef>
+          </p:style>
+          <p:txBody>
+            <a:bodyPr rtlCol="0" anchor="ctr"/>
+            <a:lstStyle/>
+            <a:p>
+              <a:pPr algn="ctr"/>
+              <a:endParaRPr lang="fr-FR"/>
+            </a:p>
+          </p:txBody>
+        </p:sp>
+        <p:sp>
+          <p:nvSpPr>
+            <p:cNvPr id="8" name="Losange 7">
+              <a:extLst>
+                <a:ext uri="{FF2B5EF4-FFF2-40B4-BE49-F238E27FC236}">
+                  <a16:creationId xmlns:a16="http://schemas.microsoft.com/office/drawing/2014/main" id="{7E5E2B90-469E-4ACF-8A26-A2BC7FB133EB}"/>
+                </a:ext>
+              </a:extLst>
+            </p:cNvPr>
+            <p:cNvSpPr/>
+            <p:nvPr/>
+          </p:nvSpPr>
+          <p:spPr>
+            <a:xfrm>
+              <a:off x="584474" y="6273316"/>
+              <a:ext cx="216024" cy="216024"/>
+            </a:xfrm>
+            <a:prstGeom prst="diamond">
+              <a:avLst/>
+            </a:prstGeom>
+            <a:solidFill>
+              <a:schemeClr val="bg1"/>
+            </a:solidFill>
+            <a:ln>
+              <a:solidFill>
+                <a:schemeClr val="accent1"/>
+              </a:solidFill>
+            </a:ln>
+          </p:spPr>
+          <p:style>
+            <a:lnRef idx="2">
+              <a:schemeClr val="accent1">
+                <a:shade val="50000"/>
+              </a:schemeClr>
+            </a:lnRef>
+            <a:fillRef idx="1">
+              <a:schemeClr val="accent1"/>
+            </a:fillRef>
+            <a:effectRef idx="0">
+              <a:schemeClr val="accent1"/>
+            </a:effectRef>
+            <a:fontRef idx="minor">
+              <a:schemeClr val="lt1"/>
+            </a:fontRef>
+          </p:style>
+          <p:txBody>
+            <a:bodyPr rtlCol="0" anchor="ctr"/>
+            <a:lstStyle/>
+            <a:p>
+              <a:pPr algn="ctr"/>
+              <a:endParaRPr lang="fr-FR"/>
+            </a:p>
+          </p:txBody>
+        </p:sp>
+        <p:sp>
+          <p:nvSpPr>
+            <p:cNvPr id="9" name="Losange 8">
+              <a:extLst>
+                <a:ext uri="{FF2B5EF4-FFF2-40B4-BE49-F238E27FC236}">
+                  <a16:creationId xmlns:a16="http://schemas.microsoft.com/office/drawing/2014/main" id="{D35975F0-F165-4A2A-8B05-7D65164E28EE}"/>
+                </a:ext>
+              </a:extLst>
+            </p:cNvPr>
+            <p:cNvSpPr/>
+            <p:nvPr/>
+          </p:nvSpPr>
+          <p:spPr>
+            <a:xfrm>
+              <a:off x="839489" y="6273316"/>
+              <a:ext cx="216024" cy="216024"/>
+            </a:xfrm>
+            <a:prstGeom prst="diamond">
+              <a:avLst/>
+            </a:prstGeom>
+            <a:solidFill>
+              <a:schemeClr val="bg1"/>
+            </a:solidFill>
+            <a:ln>
+              <a:solidFill>
+                <a:schemeClr val="accent1"/>
+              </a:solidFill>
+            </a:ln>
+          </p:spPr>
+          <p:style>
+            <a:lnRef idx="2">
+              <a:schemeClr val="accent1">
+                <a:shade val="50000"/>
+              </a:schemeClr>
+            </a:lnRef>
+            <a:fillRef idx="1">
+              <a:schemeClr val="accent1"/>
+            </a:fillRef>
+            <a:effectRef idx="0">
+              <a:schemeClr val="accent1"/>
+            </a:effectRef>
+            <a:fontRef idx="minor">
+              <a:schemeClr val="lt1"/>
+            </a:fontRef>
+          </p:style>
+          <p:txBody>
+            <a:bodyPr rtlCol="0" anchor="ctr"/>
+            <a:lstStyle/>
+            <a:p>
+              <a:pPr algn="ctr"/>
+              <a:endParaRPr lang="fr-FR"/>
+            </a:p>
+          </p:txBody>
+        </p:sp>
+      </p:grpSp>
+    </p:spTree>
+    <p:extLst>
+      <p:ext uri="{BB962C8B-B14F-4D97-AF65-F5344CB8AC3E}">
+        <p14:creationId xmlns:p14="http://schemas.microsoft.com/office/powerpoint/2010/main" val="3032557954"/>
       </p:ext>
     </p:extLst>
   </p:cSld>

</xml_diff>